<commit_message>
Upando Mockup de Tela, Atualização no Slide e correção gramatical na Dash
</commit_message>
<xml_diff>
--- a/Documentacao/Slides KPRunnin - Sprint 2.pptx
+++ b/Documentacao/Slides KPRunnin - Sprint 2.pptx
@@ -5,7 +5,7 @@
     <p:sldMasterId id="2147483665" r:id="rId1"/>
   </p:sldMasterIdLst>
   <p:notesMasterIdLst>
-    <p:notesMasterId r:id="rId22"/>
+    <p:notesMasterId r:id="rId21"/>
   </p:notesMasterIdLst>
   <p:sldIdLst>
     <p:sldId id="256" r:id="rId2"/>
@@ -23,49 +23,48 @@
     <p:sldId id="315" r:id="rId14"/>
     <p:sldId id="316" r:id="rId15"/>
     <p:sldId id="323" r:id="rId16"/>
-    <p:sldId id="324" r:id="rId17"/>
-    <p:sldId id="291" r:id="rId18"/>
-    <p:sldId id="312" r:id="rId19"/>
-    <p:sldId id="292" r:id="rId20"/>
-    <p:sldId id="311" r:id="rId21"/>
+    <p:sldId id="291" r:id="rId17"/>
+    <p:sldId id="312" r:id="rId18"/>
+    <p:sldId id="292" r:id="rId19"/>
+    <p:sldId id="311" r:id="rId20"/>
   </p:sldIdLst>
   <p:sldSz cx="9144000" cy="5143500" type="screen16x9"/>
   <p:notesSz cx="6858000" cy="9144000"/>
   <p:embeddedFontLst>
     <p:embeddedFont>
-      <p:font typeface="Roboto Light" panose="020B0604020202020204" charset="0"/>
-      <p:regular r:id="rId23"/>
-      <p:bold r:id="rId24"/>
-      <p:italic r:id="rId25"/>
-      <p:boldItalic r:id="rId26"/>
+      <p:font typeface="Bahnschrift" panose="020B0502040204020203" pitchFamily="34" charset="0"/>
+      <p:regular r:id="rId22"/>
+      <p:bold r:id="rId23"/>
     </p:embeddedFont>
     <p:embeddedFont>
       <p:font typeface="Gadugi" panose="020B0502040204020203" pitchFamily="34" charset="0"/>
-      <p:regular r:id="rId27"/>
-      <p:bold r:id="rId28"/>
+      <p:regular r:id="rId24"/>
+      <p:bold r:id="rId25"/>
+    </p:embeddedFont>
+    <p:embeddedFont>
+      <p:font typeface="Roboto Thin" panose="020B0604020202020204" charset="0"/>
+      <p:regular r:id="rId26"/>
+      <p:bold r:id="rId27"/>
+      <p:italic r:id="rId28"/>
+      <p:boldItalic r:id="rId29"/>
+    </p:embeddedFont>
+    <p:embeddedFont>
+      <p:font typeface="Roboto Light" panose="020B0604020202020204" charset="0"/>
+      <p:regular r:id="rId30"/>
+      <p:bold r:id="rId31"/>
+      <p:italic r:id="rId32"/>
+      <p:boldItalic r:id="rId33"/>
     </p:embeddedFont>
     <p:embeddedFont>
       <p:font typeface="Josefin Sans" panose="020B0604020202020204" charset="0"/>
-      <p:regular r:id="rId29"/>
-      <p:bold r:id="rId30"/>
-      <p:italic r:id="rId31"/>
-      <p:boldItalic r:id="rId32"/>
+      <p:regular r:id="rId34"/>
+      <p:bold r:id="rId35"/>
+      <p:italic r:id="rId36"/>
+      <p:boldItalic r:id="rId37"/>
     </p:embeddedFont>
     <p:embeddedFont>
       <p:font typeface="Lucida Sans Unicode" panose="020B0602030504020204" pitchFamily="34" charset="0"/>
-      <p:regular r:id="rId33"/>
-    </p:embeddedFont>
-    <p:embeddedFont>
-      <p:font typeface="Bahnschrift" panose="020B0502040204020203" pitchFamily="34" charset="0"/>
-      <p:regular r:id="rId34"/>
-      <p:bold r:id="rId35"/>
-    </p:embeddedFont>
-    <p:embeddedFont>
-      <p:font typeface="Roboto Thin" panose="020B0604020202020204" charset="0"/>
-      <p:regular r:id="rId36"/>
-      <p:bold r:id="rId37"/>
-      <p:italic r:id="rId38"/>
-      <p:boldItalic r:id="rId39"/>
+      <p:regular r:id="rId38"/>
     </p:embeddedFont>
   </p:embeddedFontLst>
   <p:defaultTextStyle>
@@ -1613,7 +1612,7 @@
     </p:spTree>
     <p:extLst>
       <p:ext uri="{BB962C8B-B14F-4D97-AF65-F5344CB8AC3E}">
-        <p14:creationId xmlns:p14="http://schemas.microsoft.com/office/powerpoint/2010/main" val="1402656764"/>
+        <p14:creationId xmlns:p14="http://schemas.microsoft.com/office/powerpoint/2010/main" val="3927447842"/>
       </p:ext>
     </p:extLst>
   </p:cSld>
@@ -1722,7 +1721,7 @@
     </p:spTree>
     <p:extLst>
       <p:ext uri="{BB962C8B-B14F-4D97-AF65-F5344CB8AC3E}">
-        <p14:creationId xmlns:p14="http://schemas.microsoft.com/office/powerpoint/2010/main" val="3927447842"/>
+        <p14:creationId xmlns:p14="http://schemas.microsoft.com/office/powerpoint/2010/main" val="1891666107"/>
       </p:ext>
     </p:extLst>
   </p:cSld>
@@ -1831,7 +1830,7 @@
     </p:spTree>
     <p:extLst>
       <p:ext uri="{BB962C8B-B14F-4D97-AF65-F5344CB8AC3E}">
-        <p14:creationId xmlns:p14="http://schemas.microsoft.com/office/powerpoint/2010/main" val="1891666107"/>
+        <p14:creationId xmlns:p14="http://schemas.microsoft.com/office/powerpoint/2010/main" val="3254058936"/>
       </p:ext>
     </p:extLst>
   </p:cSld>
@@ -1940,7 +1939,7 @@
     </p:spTree>
     <p:extLst>
       <p:ext uri="{BB962C8B-B14F-4D97-AF65-F5344CB8AC3E}">
-        <p14:creationId xmlns:p14="http://schemas.microsoft.com/office/powerpoint/2010/main" val="3254058936"/>
+        <p14:creationId xmlns:p14="http://schemas.microsoft.com/office/powerpoint/2010/main" val="833703569"/>
       </p:ext>
     </p:extLst>
   </p:cSld>
@@ -2050,115 +2049,6 @@
     <p:extLst>
       <p:ext uri="{BB962C8B-B14F-4D97-AF65-F5344CB8AC3E}">
         <p14:creationId xmlns:p14="http://schemas.microsoft.com/office/powerpoint/2010/main" val="2116290247"/>
-      </p:ext>
-    </p:extLst>
-  </p:cSld>
-  <p:clrMapOvr>
-    <a:masterClrMapping/>
-  </p:clrMapOvr>
-</p:notes>
-</file>
-
-<file path=ppt/notesSlides/notesSlide20.xml><?xml version="1.0" encoding="utf-8"?>
-<p:notes xmlns:a="http://schemas.openxmlformats.org/drawingml/2006/main" xmlns:r="http://schemas.openxmlformats.org/officeDocument/2006/relationships" xmlns:p="http://schemas.openxmlformats.org/presentationml/2006/main" showMasterSp="0" showMasterPhAnim="0">
-  <p:cSld>
-    <p:spTree>
-      <p:nvGrpSpPr>
-        <p:cNvPr id="1" name="Shape 319"/>
-        <p:cNvGrpSpPr/>
-        <p:nvPr/>
-      </p:nvGrpSpPr>
-      <p:grpSpPr>
-        <a:xfrm>
-          <a:off x="0" y="0"/>
-          <a:ext cx="0" cy="0"/>
-          <a:chOff x="0" y="0"/>
-          <a:chExt cx="0" cy="0"/>
-        </a:xfrm>
-      </p:grpSpPr>
-      <p:sp>
-        <p:nvSpPr>
-          <p:cNvPr id="320" name="Google Shape;320;p:notes"/>
-          <p:cNvSpPr>
-            <a:spLocks noGrp="1" noRot="1" noChangeAspect="1"/>
-          </p:cNvSpPr>
-          <p:nvPr>
-            <p:ph type="sldImg" idx="2"/>
-          </p:nvPr>
-        </p:nvSpPr>
-        <p:spPr>
-          <a:xfrm>
-            <a:off x="381000" y="685800"/>
-            <a:ext cx="6096000" cy="3429000"/>
-          </a:xfrm>
-          <a:custGeom>
-            <a:avLst/>
-            <a:gdLst/>
-            <a:ahLst/>
-            <a:cxnLst/>
-            <a:rect l="l" t="t" r="r" b="b"/>
-            <a:pathLst>
-              <a:path w="120000" h="120000" extrusionOk="0">
-                <a:moveTo>
-                  <a:pt x="0" y="0"/>
-                </a:moveTo>
-                <a:lnTo>
-                  <a:pt x="120000" y="0"/>
-                </a:lnTo>
-                <a:lnTo>
-                  <a:pt x="120000" y="120000"/>
-                </a:lnTo>
-                <a:lnTo>
-                  <a:pt x="0" y="120000"/>
-                </a:lnTo>
-                <a:close/>
-              </a:path>
-            </a:pathLst>
-          </a:custGeom>
-        </p:spPr>
-      </p:sp>
-      <p:sp>
-        <p:nvSpPr>
-          <p:cNvPr id="321" name="Google Shape;321;p:notes"/>
-          <p:cNvSpPr txBox="1">
-            <a:spLocks noGrp="1"/>
-          </p:cNvSpPr>
-          <p:nvPr>
-            <p:ph type="body" idx="1"/>
-          </p:nvPr>
-        </p:nvSpPr>
-        <p:spPr>
-          <a:xfrm>
-            <a:off x="685800" y="4343400"/>
-            <a:ext cx="5486400" cy="4114800"/>
-          </a:xfrm>
-          <a:prstGeom prst="rect">
-            <a:avLst/>
-          </a:prstGeom>
-        </p:spPr>
-        <p:txBody>
-          <a:bodyPr spcFirstLastPara="1" wrap="square" lIns="91425" tIns="91425" rIns="91425" bIns="91425" anchor="t" anchorCtr="0">
-            <a:noAutofit/>
-          </a:bodyPr>
-          <a:lstStyle/>
-          <a:p>
-            <a:pPr marL="0" lvl="0" indent="0" algn="l" rtl="0">
-              <a:spcBef>
-                <a:spcPts val="0"/>
-              </a:spcBef>
-              <a:spcAft>
-                <a:spcPts val="0"/>
-              </a:spcAft>
-              <a:buNone/>
-            </a:pPr>
-            <a:endParaRPr/>
-          </a:p>
-        </p:txBody>
-      </p:sp>
-    </p:spTree>
-    <p:extLst>
-      <p:ext uri="{BB962C8B-B14F-4D97-AF65-F5344CB8AC3E}">
-        <p14:creationId xmlns:p14="http://schemas.microsoft.com/office/powerpoint/2010/main" val="833703569"/>
       </p:ext>
     </p:extLst>
   </p:cSld>
@@ -15807,7 +15697,7 @@
           <p:cNvPr id="14" name="Imagem 13">
             <a:extLst>
               <a:ext uri="{FF2B5EF4-FFF2-40B4-BE49-F238E27FC236}">
-                <a16:creationId xmlns:a16="http://schemas.microsoft.com/office/drawing/2014/main" xmlns="" id="{A1546BA2-A746-4D78-BA2A-66EACE53308E}"/>
+                <a16:creationId xmlns="" xmlns:a16="http://schemas.microsoft.com/office/drawing/2014/main" id="{A1546BA2-A746-4D78-BA2A-66EACE53308E}"/>
               </a:ext>
             </a:extLst>
           </p:cNvPr>
@@ -16064,7 +15954,7 @@
           <p:cNvPr id="7" name="Imagem 6">
             <a:extLst>
               <a:ext uri="{FF2B5EF4-FFF2-40B4-BE49-F238E27FC236}">
-                <a16:creationId xmlns:a16="http://schemas.microsoft.com/office/drawing/2014/main" xmlns="" id="{A1546BA2-A746-4D78-BA2A-66EACE53308E}"/>
+                <a16:creationId xmlns="" xmlns:a16="http://schemas.microsoft.com/office/drawing/2014/main" id="{A1546BA2-A746-4D78-BA2A-66EACE53308E}"/>
               </a:ext>
             </a:extLst>
           </p:cNvPr>
@@ -16135,13 +16025,13 @@
   <p:clrMapOvr>
     <a:masterClrMapping/>
   </p:clrMapOvr>
-  <mc:AlternateContent xmlns:mc="http://schemas.openxmlformats.org/markup-compatibility/2006">
-    <mc:Choice xmlns:p14="http://schemas.microsoft.com/office/powerpoint/2010/main" Requires="p14">
+  <mc:AlternateContent xmlns:mc="http://schemas.openxmlformats.org/markup-compatibility/2006" xmlns:p14="http://schemas.microsoft.com/office/powerpoint/2010/main">
+    <mc:Choice Requires="p14">
       <p:transition spd="med" p14:dur="700">
         <p:fade/>
       </p:transition>
     </mc:Choice>
-    <mc:Fallback>
+    <mc:Fallback xmlns="">
       <p:transition spd="med">
         <p:fade/>
       </p:transition>
@@ -16410,7 +16300,7 @@
           <p:cNvPr id="14" name="Imagem 13">
             <a:extLst>
               <a:ext uri="{FF2B5EF4-FFF2-40B4-BE49-F238E27FC236}">
-                <a16:creationId xmlns:a16="http://schemas.microsoft.com/office/drawing/2014/main" xmlns="" id="{A1546BA2-A746-4D78-BA2A-66EACE53308E}"/>
+                <a16:creationId xmlns="" xmlns:a16="http://schemas.microsoft.com/office/drawing/2014/main" id="{A1546BA2-A746-4D78-BA2A-66EACE53308E}"/>
               </a:ext>
             </a:extLst>
           </p:cNvPr>
@@ -16451,13 +16341,13 @@
   <p:clrMapOvr>
     <a:masterClrMapping/>
   </p:clrMapOvr>
-  <mc:AlternateContent xmlns:mc="http://schemas.openxmlformats.org/markup-compatibility/2006">
-    <mc:Choice xmlns:p14="http://schemas.microsoft.com/office/powerpoint/2010/main" Requires="p14">
+  <mc:AlternateContent xmlns:mc="http://schemas.openxmlformats.org/markup-compatibility/2006" xmlns:p14="http://schemas.microsoft.com/office/powerpoint/2010/main">
+    <mc:Choice Requires="p14">
       <p:transition spd="med" p14:dur="700">
         <p:fade/>
       </p:transition>
     </mc:Choice>
-    <mc:Fallback>
+    <mc:Fallback xmlns="">
       <p:transition spd="med">
         <p:fade/>
       </p:transition>
@@ -16680,7 +16570,7 @@
           <p:cNvPr id="7" name="Imagem 6">
             <a:extLst>
               <a:ext uri="{FF2B5EF4-FFF2-40B4-BE49-F238E27FC236}">
-                <a16:creationId xmlns:a16="http://schemas.microsoft.com/office/drawing/2014/main" xmlns="" id="{A1546BA2-A746-4D78-BA2A-66EACE53308E}"/>
+                <a16:creationId xmlns="" xmlns:a16="http://schemas.microsoft.com/office/drawing/2014/main" id="{A1546BA2-A746-4D78-BA2A-66EACE53308E}"/>
               </a:ext>
             </a:extLst>
           </p:cNvPr>
@@ -16716,7 +16606,7 @@
           <p:cNvPr id="8" name="Imagem 7" descr="Uma imagem contendo relógio&#10;&#10;Descrição gerada automaticamente">
             <a:extLst>
               <a:ext uri="{FF2B5EF4-FFF2-40B4-BE49-F238E27FC236}">
-                <a16:creationId xmlns:a16="http://schemas.microsoft.com/office/drawing/2014/main" xmlns="" id="{EA954568-830E-4114-A575-5A8F5CE2BDC0}"/>
+                <a16:creationId xmlns="" xmlns:a16="http://schemas.microsoft.com/office/drawing/2014/main" id="{EA954568-830E-4114-A575-5A8F5CE2BDC0}"/>
               </a:ext>
             </a:extLst>
           </p:cNvPr>
@@ -16858,13 +16748,13 @@
   <p:clrMapOvr>
     <a:masterClrMapping/>
   </p:clrMapOvr>
-  <mc:AlternateContent xmlns:mc="http://schemas.openxmlformats.org/markup-compatibility/2006">
-    <mc:Choice xmlns:p14="http://schemas.microsoft.com/office/powerpoint/2010/main" Requires="p14">
+  <mc:AlternateContent xmlns:mc="http://schemas.openxmlformats.org/markup-compatibility/2006" xmlns:p14="http://schemas.microsoft.com/office/powerpoint/2010/main">
+    <mc:Choice Requires="p14">
       <p:transition spd="med" p14:dur="700">
         <p:fade/>
       </p:transition>
     </mc:Choice>
-    <mc:Fallback>
+    <mc:Fallback xmlns="">
       <p:transition spd="med">
         <p:fade/>
       </p:transition>
@@ -17087,7 +16977,7 @@
           <p:cNvPr id="7" name="Imagem 6">
             <a:extLst>
               <a:ext uri="{FF2B5EF4-FFF2-40B4-BE49-F238E27FC236}">
-                <a16:creationId xmlns:a16="http://schemas.microsoft.com/office/drawing/2014/main" xmlns="" id="{A1546BA2-A746-4D78-BA2A-66EACE53308E}"/>
+                <a16:creationId xmlns="" xmlns:a16="http://schemas.microsoft.com/office/drawing/2014/main" id="{A1546BA2-A746-4D78-BA2A-66EACE53308E}"/>
               </a:ext>
             </a:extLst>
           </p:cNvPr>
@@ -17158,13 +17048,13 @@
   <p:clrMapOvr>
     <a:masterClrMapping/>
   </p:clrMapOvr>
-  <mc:AlternateContent xmlns:mc="http://schemas.openxmlformats.org/markup-compatibility/2006">
-    <mc:Choice xmlns:p14="http://schemas.microsoft.com/office/powerpoint/2010/main" Requires="p14">
+  <mc:AlternateContent xmlns:mc="http://schemas.openxmlformats.org/markup-compatibility/2006" xmlns:p14="http://schemas.microsoft.com/office/powerpoint/2010/main">
+    <mc:Choice Requires="p14">
       <p:transition spd="med" p14:dur="700">
         <p:fade/>
       </p:transition>
     </mc:Choice>
-    <mc:Fallback>
+    <mc:Fallback xmlns="">
       <p:transition spd="med">
         <p:fade/>
       </p:transition>
@@ -17387,7 +17277,7 @@
           <p:cNvPr id="7" name="Imagem 6">
             <a:extLst>
               <a:ext uri="{FF2B5EF4-FFF2-40B4-BE49-F238E27FC236}">
-                <a16:creationId xmlns:a16="http://schemas.microsoft.com/office/drawing/2014/main" xmlns="" id="{A1546BA2-A746-4D78-BA2A-66EACE53308E}"/>
+                <a16:creationId xmlns="" xmlns:a16="http://schemas.microsoft.com/office/drawing/2014/main" id="{A1546BA2-A746-4D78-BA2A-66EACE53308E}"/>
               </a:ext>
             </a:extLst>
           </p:cNvPr>
@@ -17458,13 +17348,13 @@
   <p:clrMapOvr>
     <a:masterClrMapping/>
   </p:clrMapOvr>
-  <mc:AlternateContent xmlns:mc="http://schemas.openxmlformats.org/markup-compatibility/2006">
-    <mc:Choice xmlns:p14="http://schemas.microsoft.com/office/powerpoint/2010/main" Requires="p14">
+  <mc:AlternateContent xmlns:mc="http://schemas.openxmlformats.org/markup-compatibility/2006" xmlns:p14="http://schemas.microsoft.com/office/powerpoint/2010/main">
+    <mc:Choice Requires="p14">
       <p:transition spd="med" p14:dur="700">
         <p:fade/>
       </p:transition>
     </mc:Choice>
-    <mc:Fallback>
+    <mc:Fallback xmlns="">
       <p:transition spd="med">
         <p:fade/>
       </p:transition>
@@ -17721,7 +17611,7 @@
           <p:cNvPr id="14" name="Imagem 13">
             <a:extLst>
               <a:ext uri="{FF2B5EF4-FFF2-40B4-BE49-F238E27FC236}">
-                <a16:creationId xmlns:a16="http://schemas.microsoft.com/office/drawing/2014/main" xmlns="" id="{A1546BA2-A746-4D78-BA2A-66EACE53308E}"/>
+                <a16:creationId xmlns="" xmlns:a16="http://schemas.microsoft.com/office/drawing/2014/main" id="{A1546BA2-A746-4D78-BA2A-66EACE53308E}"/>
               </a:ext>
             </a:extLst>
           </p:cNvPr>
@@ -17762,13 +17652,13 @@
   <p:clrMapOvr>
     <a:masterClrMapping/>
   </p:clrMapOvr>
-  <mc:AlternateContent xmlns:mc="http://schemas.openxmlformats.org/markup-compatibility/2006">
-    <mc:Choice xmlns:p14="http://schemas.microsoft.com/office/powerpoint/2010/main" Requires="p14">
+  <mc:AlternateContent xmlns:mc="http://schemas.openxmlformats.org/markup-compatibility/2006" xmlns:p14="http://schemas.microsoft.com/office/powerpoint/2010/main">
+    <mc:Choice Requires="p14">
       <p:transition spd="med" p14:dur="700">
         <p:fade/>
       </p:transition>
     </mc:Choice>
-    <mc:Fallback>
+    <mc:Fallback xmlns="">
       <p:transition spd="med">
         <p:fade/>
       </p:transition>
@@ -17954,8 +17844,8 @@
         </p:nvSpPr>
         <p:spPr>
           <a:xfrm>
-            <a:off x="720000" y="804075"/>
-            <a:ext cx="7704000" cy="1989000"/>
+            <a:off x="720000" y="1172817"/>
+            <a:ext cx="6475457" cy="1620257"/>
           </a:xfrm>
           <a:prstGeom prst="rect">
             <a:avLst/>
@@ -17978,17 +17868,22 @@
             </a:pPr>
             <a:r>
               <a:rPr lang="pt-BR" sz="4400" dirty="0" smtClean="0">
-                <a:latin typeface="Josefin Sans"/>
-                <a:ea typeface="Josefin Sans"/>
-                <a:cs typeface="Josefin Sans"/>
                 <a:sym typeface="Josefin Sans"/>
               </a:rPr>
-              <a:t>?</a:t>
+              <a:t>INSTITUCIONAL &amp;</a:t>
+            </a:r>
+            <a:br>
+              <a:rPr lang="pt-BR" sz="4400" dirty="0" smtClean="0">
+                <a:sym typeface="Josefin Sans"/>
+              </a:rPr>
+            </a:br>
+            <a:r>
+              <a:rPr lang="pt-BR" sz="4400" dirty="0" smtClean="0">
+                <a:sym typeface="Josefin Sans"/>
+              </a:rPr>
+              <a:t>DASHBOARD</a:t>
             </a:r>
             <a:endParaRPr sz="4400" dirty="0">
-              <a:latin typeface="Josefin Sans"/>
-              <a:ea typeface="Josefin Sans"/>
-              <a:cs typeface="Josefin Sans"/>
               <a:sym typeface="Josefin Sans"/>
             </a:endParaRPr>
           </a:p>
@@ -18025,7 +17920,7 @@
           <p:cNvPr id="14" name="Imagem 13">
             <a:extLst>
               <a:ext uri="{FF2B5EF4-FFF2-40B4-BE49-F238E27FC236}">
-                <a16:creationId xmlns:a16="http://schemas.microsoft.com/office/drawing/2014/main" xmlns="" id="{A1546BA2-A746-4D78-BA2A-66EACE53308E}"/>
+                <a16:creationId xmlns="" xmlns:a16="http://schemas.microsoft.com/office/drawing/2014/main" id="{A1546BA2-A746-4D78-BA2A-66EACE53308E}"/>
               </a:ext>
             </a:extLst>
           </p:cNvPr>
@@ -18059,20 +17954,20 @@
     </p:spTree>
     <p:extLst>
       <p:ext uri="{BB962C8B-B14F-4D97-AF65-F5344CB8AC3E}">
-        <p14:creationId xmlns:p14="http://schemas.microsoft.com/office/powerpoint/2010/main" val="3793235753"/>
+        <p14:creationId xmlns:p14="http://schemas.microsoft.com/office/powerpoint/2010/main" val="2068368945"/>
       </p:ext>
     </p:extLst>
   </p:cSld>
   <p:clrMapOvr>
     <a:masterClrMapping/>
   </p:clrMapOvr>
-  <mc:AlternateContent xmlns:mc="http://schemas.openxmlformats.org/markup-compatibility/2006">
-    <mc:Choice xmlns:p14="http://schemas.microsoft.com/office/powerpoint/2010/main" Requires="p14">
+  <mc:AlternateContent xmlns:mc="http://schemas.openxmlformats.org/markup-compatibility/2006" xmlns:p14="http://schemas.microsoft.com/office/powerpoint/2010/main">
+    <mc:Choice Requires="p14">
       <p:transition spd="med" p14:dur="700">
         <p:fade/>
       </p:transition>
     </mc:Choice>
-    <mc:Fallback>
+    <mc:Fallback xmlns="">
       <p:transition spd="med">
         <p:fade/>
       </p:transition>
@@ -18258,8 +18153,8 @@
         </p:nvSpPr>
         <p:spPr>
           <a:xfrm>
-            <a:off x="720000" y="1172817"/>
-            <a:ext cx="6475457" cy="1620257"/>
+            <a:off x="720000" y="1513113"/>
+            <a:ext cx="6475457" cy="1279961"/>
           </a:xfrm>
           <a:prstGeom prst="rect">
             <a:avLst/>
@@ -18284,18 +18179,7 @@
               <a:rPr lang="pt-BR" sz="4400" dirty="0" smtClean="0">
                 <a:sym typeface="Josefin Sans"/>
               </a:rPr>
-              <a:t>INSTITUCIONAL &amp;</a:t>
-            </a:r>
-            <a:br>
-              <a:rPr lang="pt-BR" sz="4400" dirty="0" smtClean="0">
-                <a:sym typeface="Josefin Sans"/>
-              </a:rPr>
-            </a:br>
-            <a:r>
-              <a:rPr lang="pt-BR" sz="4400" dirty="0" smtClean="0">
-                <a:sym typeface="Josefin Sans"/>
-              </a:rPr>
-              <a:t>DASHBOARD</a:t>
+              <a:t>JFRAME</a:t>
             </a:r>
             <a:endParaRPr sz="4400" dirty="0">
               <a:sym typeface="Josefin Sans"/>
@@ -18334,7 +18218,7 @@
           <p:cNvPr id="14" name="Imagem 13">
             <a:extLst>
               <a:ext uri="{FF2B5EF4-FFF2-40B4-BE49-F238E27FC236}">
-                <a16:creationId xmlns:a16="http://schemas.microsoft.com/office/drawing/2014/main" xmlns="" id="{A1546BA2-A746-4D78-BA2A-66EACE53308E}"/>
+                <a16:creationId xmlns="" xmlns:a16="http://schemas.microsoft.com/office/drawing/2014/main" id="{A1546BA2-A746-4D78-BA2A-66EACE53308E}"/>
               </a:ext>
             </a:extLst>
           </p:cNvPr>
@@ -18368,7 +18252,7 @@
     </p:spTree>
     <p:extLst>
       <p:ext uri="{BB962C8B-B14F-4D97-AF65-F5344CB8AC3E}">
-        <p14:creationId xmlns:p14="http://schemas.microsoft.com/office/powerpoint/2010/main" val="2068368945"/>
+        <p14:creationId xmlns:p14="http://schemas.microsoft.com/office/powerpoint/2010/main" val="3761580062"/>
       </p:ext>
     </p:extLst>
   </p:cSld>
@@ -18567,8 +18451,8 @@
         </p:nvSpPr>
         <p:spPr>
           <a:xfrm>
-            <a:off x="720000" y="1513113"/>
-            <a:ext cx="6475457" cy="1279961"/>
+            <a:off x="720000" y="804075"/>
+            <a:ext cx="7704000" cy="1989000"/>
           </a:xfrm>
           <a:prstGeom prst="rect">
             <a:avLst/>
@@ -18591,11 +18475,29 @@
             </a:pPr>
             <a:r>
               <a:rPr lang="pt-BR" sz="4400" dirty="0" smtClean="0">
+                <a:latin typeface="Josefin Sans"/>
+                <a:ea typeface="Josefin Sans"/>
+                <a:cs typeface="Josefin Sans"/>
                 <a:sym typeface="Josefin Sans"/>
               </a:rPr>
-              <a:t>JFRAME</a:t>
+              <a:t>CLIENTE EM </a:t>
+            </a:r>
+            <a:br>
+              <a:rPr lang="pt-BR" sz="4400" dirty="0" smtClean="0">
+                <a:latin typeface="Josefin Sans"/>
+                <a:ea typeface="Josefin Sans"/>
+                <a:cs typeface="Josefin Sans"/>
+                <a:sym typeface="Josefin Sans"/>
+              </a:rPr>
+            </a:br>
+            <a:r>
+              <a:rPr lang="pt-BR" sz="4400" dirty="0" smtClean="0"/>
+              <a:t>MÁQUINA VIRTUAL</a:t>
             </a:r>
             <a:endParaRPr sz="4400" dirty="0">
+              <a:latin typeface="Josefin Sans"/>
+              <a:ea typeface="Josefin Sans"/>
+              <a:cs typeface="Josefin Sans"/>
               <a:sym typeface="Josefin Sans"/>
             </a:endParaRPr>
           </a:p>
@@ -18632,7 +18534,7 @@
           <p:cNvPr id="14" name="Imagem 13">
             <a:extLst>
               <a:ext uri="{FF2B5EF4-FFF2-40B4-BE49-F238E27FC236}">
-                <a16:creationId xmlns:a16="http://schemas.microsoft.com/office/drawing/2014/main" xmlns="" id="{A1546BA2-A746-4D78-BA2A-66EACE53308E}"/>
+                <a16:creationId xmlns="" xmlns:a16="http://schemas.microsoft.com/office/drawing/2014/main" id="{A1546BA2-A746-4D78-BA2A-66EACE53308E}"/>
               </a:ext>
             </a:extLst>
           </p:cNvPr>
@@ -18666,20 +18568,20 @@
     </p:spTree>
     <p:extLst>
       <p:ext uri="{BB962C8B-B14F-4D97-AF65-F5344CB8AC3E}">
-        <p14:creationId xmlns:p14="http://schemas.microsoft.com/office/powerpoint/2010/main" val="3761580062"/>
+        <p14:creationId xmlns:p14="http://schemas.microsoft.com/office/powerpoint/2010/main" val="1482589489"/>
       </p:ext>
     </p:extLst>
   </p:cSld>
   <p:clrMapOvr>
     <a:masterClrMapping/>
   </p:clrMapOvr>
-  <mc:AlternateContent xmlns:mc="http://schemas.openxmlformats.org/markup-compatibility/2006">
-    <mc:Choice xmlns:p14="http://schemas.microsoft.com/office/powerpoint/2010/main" Requires="p14">
+  <mc:AlternateContent xmlns:mc="http://schemas.openxmlformats.org/markup-compatibility/2006" xmlns:p14="http://schemas.microsoft.com/office/powerpoint/2010/main">
+    <mc:Choice Requires="p14">
       <p:transition spd="med" p14:dur="700">
         <p:fade/>
       </p:transition>
     </mc:Choice>
-    <mc:Fallback>
+    <mc:Fallback xmlns="">
       <p:transition spd="med">
         <p:fade/>
       </p:transition>
@@ -18888,27 +18790,10 @@
               <a:buNone/>
             </a:pPr>
             <a:r>
-              <a:rPr lang="pt-BR" sz="4400" dirty="0" smtClean="0">
-                <a:latin typeface="Josefin Sans"/>
-                <a:ea typeface="Josefin Sans"/>
-                <a:cs typeface="Josefin Sans"/>
-                <a:sym typeface="Josefin Sans"/>
-              </a:rPr>
-              <a:t>CLIENTE EM </a:t>
+              <a:rPr lang="pt-BR" dirty="0"/>
+              <a:t>OBRIGADO!</a:t>
             </a:r>
-            <a:br>
-              <a:rPr lang="pt-BR" sz="4400" dirty="0" smtClean="0">
-                <a:latin typeface="Josefin Sans"/>
-                <a:ea typeface="Josefin Sans"/>
-                <a:cs typeface="Josefin Sans"/>
-                <a:sym typeface="Josefin Sans"/>
-              </a:rPr>
-            </a:br>
-            <a:r>
-              <a:rPr lang="pt-BR" sz="4400" dirty="0" smtClean="0"/>
-              <a:t>MÁQUINA VIRTUAL</a:t>
-            </a:r>
-            <a:endParaRPr sz="4400" dirty="0">
+            <a:endParaRPr dirty="0">
               <a:latin typeface="Josefin Sans"/>
               <a:ea typeface="Josefin Sans"/>
               <a:cs typeface="Josefin Sans"/>
@@ -18948,7 +18833,7 @@
           <p:cNvPr id="14" name="Imagem 13">
             <a:extLst>
               <a:ext uri="{FF2B5EF4-FFF2-40B4-BE49-F238E27FC236}">
-                <a16:creationId xmlns:a16="http://schemas.microsoft.com/office/drawing/2014/main" xmlns="" id="{A1546BA2-A746-4D78-BA2A-66EACE53308E}"/>
+                <a16:creationId xmlns="" xmlns:a16="http://schemas.microsoft.com/office/drawing/2014/main" id="{A1546BA2-A746-4D78-BA2A-66EACE53308E}"/>
               </a:ext>
             </a:extLst>
           </p:cNvPr>
@@ -18982,7 +18867,7 @@
     </p:spTree>
     <p:extLst>
       <p:ext uri="{BB962C8B-B14F-4D97-AF65-F5344CB8AC3E}">
-        <p14:creationId xmlns:p14="http://schemas.microsoft.com/office/powerpoint/2010/main" val="1482589489"/>
+        <p14:creationId xmlns:p14="http://schemas.microsoft.com/office/powerpoint/2010/main" val="2862206857"/>
       </p:ext>
     </p:extLst>
   </p:cSld>
@@ -19276,11 +19161,6 @@
               </a:rPr>
               <a:t>Web Designer</a:t>
             </a:r>
-            <a:endParaRPr lang="pt-BR" sz="2800" dirty="0">
-              <a:solidFill>
-                <a:srgbClr val="92D050"/>
-              </a:solidFill>
-            </a:endParaRPr>
           </a:p>
         </p:txBody>
       </p:sp>
@@ -19349,7 +19229,7 @@
           <p:cNvPr id="22" name="Imagem 21">
             <a:extLst>
               <a:ext uri="{FF2B5EF4-FFF2-40B4-BE49-F238E27FC236}">
-                <a16:creationId xmlns:a16="http://schemas.microsoft.com/office/drawing/2014/main" xmlns="" id="{A1546BA2-A746-4D78-BA2A-66EACE53308E}"/>
+                <a16:creationId xmlns="" xmlns:a16="http://schemas.microsoft.com/office/drawing/2014/main" id="{A1546BA2-A746-4D78-BA2A-66EACE53308E}"/>
               </a:ext>
             </a:extLst>
           </p:cNvPr>
@@ -19381,305 +19261,6 @@
         </p:spPr>
       </p:pic>
     </p:spTree>
-  </p:cSld>
-  <p:clrMapOvr>
-    <a:masterClrMapping/>
-  </p:clrMapOvr>
-  <mc:AlternateContent xmlns:mc="http://schemas.openxmlformats.org/markup-compatibility/2006" xmlns:p14="http://schemas.microsoft.com/office/powerpoint/2010/main">
-    <mc:Choice Requires="p14">
-      <p:transition spd="med" p14:dur="700">
-        <p:fade/>
-      </p:transition>
-    </mc:Choice>
-    <mc:Fallback xmlns="">
-      <p:transition spd="med">
-        <p:fade/>
-      </p:transition>
-    </mc:Fallback>
-  </mc:AlternateContent>
-  <p:timing>
-    <p:tnLst>
-      <p:par>
-        <p:cTn id="1" dur="indefinite" restart="never" nodeType="tmRoot"/>
-      </p:par>
-    </p:tnLst>
-  </p:timing>
-</p:sld>
-</file>
-
-<file path=ppt/slides/slide20.xml><?xml version="1.0" encoding="utf-8"?>
-<p:sld xmlns:a="http://schemas.openxmlformats.org/drawingml/2006/main" xmlns:r="http://schemas.openxmlformats.org/officeDocument/2006/relationships" xmlns:p="http://schemas.openxmlformats.org/presentationml/2006/main">
-  <p:cSld>
-    <p:bg>
-      <p:bgPr>
-        <a:solidFill>
-          <a:srgbClr val="1F1F1F"/>
-        </a:solidFill>
-        <a:effectLst/>
-      </p:bgPr>
-    </p:bg>
-    <p:spTree>
-      <p:nvGrpSpPr>
-        <p:cNvPr id="1" name="Shape 322"/>
-        <p:cNvGrpSpPr/>
-        <p:nvPr/>
-      </p:nvGrpSpPr>
-      <p:grpSpPr>
-        <a:xfrm>
-          <a:off x="0" y="0"/>
-          <a:ext cx="0" cy="0"/>
-          <a:chOff x="0" y="0"/>
-          <a:chExt cx="0" cy="0"/>
-        </a:xfrm>
-      </p:grpSpPr>
-      <p:sp>
-        <p:nvSpPr>
-          <p:cNvPr id="323" name="Google Shape;323;p20"/>
-          <p:cNvSpPr/>
-          <p:nvPr/>
-        </p:nvSpPr>
-        <p:spPr>
-          <a:xfrm>
-            <a:off x="8806631" y="0"/>
-            <a:ext cx="307184" cy="182052"/>
-          </a:xfrm>
-          <a:custGeom>
-            <a:avLst/>
-            <a:gdLst/>
-            <a:ahLst/>
-            <a:cxnLst/>
-            <a:rect l="l" t="t" r="r" b="b"/>
-            <a:pathLst>
-              <a:path w="5850" h="3467" extrusionOk="0">
-                <a:moveTo>
-                  <a:pt x="1" y="1"/>
-                </a:moveTo>
-                <a:cubicBezTo>
-                  <a:pt x="2025" y="1032"/>
-                  <a:pt x="3976" y="2191"/>
-                  <a:pt x="5849" y="3466"/>
-                </a:cubicBezTo>
-                <a:lnTo>
-                  <a:pt x="5849" y="1576"/>
-                </a:lnTo>
-                <a:cubicBezTo>
-                  <a:pt x="5012" y="1028"/>
-                  <a:pt x="4158" y="501"/>
-                  <a:pt x="3290" y="1"/>
-                </a:cubicBezTo>
-                <a:close/>
-              </a:path>
-            </a:pathLst>
-          </a:custGeom>
-          <a:solidFill>
-            <a:srgbClr val="454444"/>
-          </a:solidFill>
-          <a:ln>
-            <a:noFill/>
-          </a:ln>
-        </p:spPr>
-        <p:txBody>
-          <a:bodyPr spcFirstLastPara="1" wrap="square" lIns="91425" tIns="91425" rIns="91425" bIns="91425" anchor="ctr" anchorCtr="0">
-            <a:noAutofit/>
-          </a:bodyPr>
-          <a:lstStyle/>
-          <a:p>
-            <a:pPr marL="0" lvl="0" indent="0" algn="l" rtl="0">
-              <a:spcBef>
-                <a:spcPts val="0"/>
-              </a:spcBef>
-              <a:spcAft>
-                <a:spcPts val="0"/>
-              </a:spcAft>
-              <a:buNone/>
-            </a:pPr>
-            <a:endParaRPr/>
-          </a:p>
-        </p:txBody>
-      </p:sp>
-      <p:sp>
-        <p:nvSpPr>
-          <p:cNvPr id="324" name="Google Shape;324;p20"/>
-          <p:cNvSpPr/>
-          <p:nvPr/>
-        </p:nvSpPr>
-        <p:spPr>
-          <a:xfrm>
-            <a:off x="8765779" y="4940764"/>
-            <a:ext cx="348036" cy="202741"/>
-          </a:xfrm>
-          <a:custGeom>
-            <a:avLst/>
-            <a:gdLst/>
-            <a:ahLst/>
-            <a:cxnLst/>
-            <a:rect l="l" t="t" r="r" b="b"/>
-            <a:pathLst>
-              <a:path w="6628" h="3861" extrusionOk="0">
-                <a:moveTo>
-                  <a:pt x="6627" y="0"/>
-                </a:moveTo>
-                <a:cubicBezTo>
-                  <a:pt x="4515" y="1439"/>
-                  <a:pt x="2302" y="2731"/>
-                  <a:pt x="0" y="3860"/>
-                </a:cubicBezTo>
-                <a:lnTo>
-                  <a:pt x="3382" y="3860"/>
-                </a:lnTo>
-                <a:cubicBezTo>
-                  <a:pt x="4489" y="3241"/>
-                  <a:pt x="5569" y="2585"/>
-                  <a:pt x="6627" y="1890"/>
-                </a:cubicBezTo>
-                <a:lnTo>
-                  <a:pt x="6627" y="0"/>
-                </a:lnTo>
-                <a:close/>
-              </a:path>
-            </a:pathLst>
-          </a:custGeom>
-          <a:solidFill>
-            <a:srgbClr val="303030"/>
-          </a:solidFill>
-          <a:ln>
-            <a:noFill/>
-          </a:ln>
-        </p:spPr>
-        <p:txBody>
-          <a:bodyPr spcFirstLastPara="1" wrap="square" lIns="91425" tIns="91425" rIns="91425" bIns="91425" anchor="ctr" anchorCtr="0">
-            <a:noAutofit/>
-          </a:bodyPr>
-          <a:lstStyle/>
-          <a:p>
-            <a:pPr marL="0" lvl="0" indent="0" algn="l" rtl="0">
-              <a:spcBef>
-                <a:spcPts val="0"/>
-              </a:spcBef>
-              <a:spcAft>
-                <a:spcPts val="0"/>
-              </a:spcAft>
-              <a:buNone/>
-            </a:pPr>
-            <a:endParaRPr/>
-          </a:p>
-        </p:txBody>
-      </p:sp>
-      <p:sp>
-        <p:nvSpPr>
-          <p:cNvPr id="325" name="Google Shape;325;p20"/>
-          <p:cNvSpPr txBox="1">
-            <a:spLocks noGrp="1"/>
-          </p:cNvSpPr>
-          <p:nvPr>
-            <p:ph type="ctrTitle"/>
-          </p:nvPr>
-        </p:nvSpPr>
-        <p:spPr>
-          <a:xfrm>
-            <a:off x="720000" y="804075"/>
-            <a:ext cx="7704000" cy="1989000"/>
-          </a:xfrm>
-          <a:prstGeom prst="rect">
-            <a:avLst/>
-          </a:prstGeom>
-        </p:spPr>
-        <p:txBody>
-          <a:bodyPr spcFirstLastPara="1" wrap="square" lIns="91425" tIns="91425" rIns="91425" bIns="91425" anchor="b" anchorCtr="0">
-            <a:noAutofit/>
-          </a:bodyPr>
-          <a:lstStyle/>
-          <a:p>
-            <a:pPr marL="0" lvl="0" indent="0" algn="l" rtl="0">
-              <a:spcBef>
-                <a:spcPts val="0"/>
-              </a:spcBef>
-              <a:spcAft>
-                <a:spcPts val="0"/>
-              </a:spcAft>
-              <a:buNone/>
-            </a:pPr>
-            <a:r>
-              <a:rPr lang="pt-BR" dirty="0"/>
-              <a:t>OBRIGADO!</a:t>
-            </a:r>
-            <a:endParaRPr dirty="0">
-              <a:latin typeface="Josefin Sans"/>
-              <a:ea typeface="Josefin Sans"/>
-              <a:cs typeface="Josefin Sans"/>
-              <a:sym typeface="Josefin Sans"/>
-            </a:endParaRPr>
-          </a:p>
-        </p:txBody>
-      </p:sp>
-      <p:cxnSp>
-        <p:nvCxnSpPr>
-          <p:cNvPr id="327" name="Google Shape;327;p20"/>
-          <p:cNvCxnSpPr/>
-          <p:nvPr/>
-        </p:nvCxnSpPr>
-        <p:spPr>
-          <a:xfrm>
-            <a:off x="841434" y="2762125"/>
-            <a:ext cx="373800" cy="0"/>
-          </a:xfrm>
-          <a:prstGeom prst="straightConnector1">
-            <a:avLst/>
-          </a:prstGeom>
-          <a:noFill/>
-          <a:ln w="19050" cap="flat" cmpd="sng">
-            <a:solidFill>
-              <a:srgbClr val="F3F3F3"/>
-            </a:solidFill>
-            <a:prstDash val="solid"/>
-            <a:round/>
-            <a:headEnd type="none" w="med" len="med"/>
-            <a:tailEnd type="none" w="med" len="med"/>
-          </a:ln>
-        </p:spPr>
-      </p:cxnSp>
-      <p:pic>
-        <p:nvPicPr>
-          <p:cNvPr id="14" name="Imagem 13">
-            <a:extLst>
-              <a:ext uri="{FF2B5EF4-FFF2-40B4-BE49-F238E27FC236}">
-                <a16:creationId xmlns:a16="http://schemas.microsoft.com/office/drawing/2014/main" xmlns="" id="{A1546BA2-A746-4D78-BA2A-66EACE53308E}"/>
-              </a:ext>
-            </a:extLst>
-          </p:cNvPr>
-          <p:cNvPicPr>
-            <a:picLocks noChangeAspect="1"/>
-          </p:cNvPicPr>
-          <p:nvPr/>
-        </p:nvPicPr>
-        <p:blipFill>
-          <a:blip r:embed="rId3">
-            <a:extLst>
-              <a:ext uri="{28A0092B-C50C-407E-A947-70E740481C1C}">
-                <a14:useLocalDpi xmlns:a14="http://schemas.microsoft.com/office/drawing/2010/main" val="0"/>
-              </a:ext>
-            </a:extLst>
-          </a:blip>
-          <a:stretch>
-            <a:fillRect/>
-          </a:stretch>
-        </p:blipFill>
-        <p:spPr>
-          <a:xfrm>
-            <a:off x="6411514" y="1407885"/>
-            <a:ext cx="2133920" cy="2133920"/>
-          </a:xfrm>
-          <a:prstGeom prst="rect">
-            <a:avLst/>
-          </a:prstGeom>
-        </p:spPr>
-      </p:pic>
-    </p:spTree>
-    <p:extLst>
-      <p:ext uri="{BB962C8B-B14F-4D97-AF65-F5344CB8AC3E}">
-        <p14:creationId xmlns:p14="http://schemas.microsoft.com/office/powerpoint/2010/main" val="2862206857"/>
-      </p:ext>
-    </p:extLst>
   </p:cSld>
   <p:clrMapOvr>
     <a:masterClrMapping/>
@@ -20689,7 +20270,7 @@
           <p:cNvPr id="23" name="Imagem 22">
             <a:extLst>
               <a:ext uri="{FF2B5EF4-FFF2-40B4-BE49-F238E27FC236}">
-                <a16:creationId xmlns:a16="http://schemas.microsoft.com/office/drawing/2014/main" xmlns="" id="{A1546BA2-A746-4D78-BA2A-66EACE53308E}"/>
+                <a16:creationId xmlns="" xmlns:a16="http://schemas.microsoft.com/office/drawing/2014/main" id="{A1546BA2-A746-4D78-BA2A-66EACE53308E}"/>
               </a:ext>
             </a:extLst>
           </p:cNvPr>
@@ -20910,7 +20491,7 @@
           <p:cNvPr id="12" name="Imagem 11">
             <a:extLst>
               <a:ext uri="{FF2B5EF4-FFF2-40B4-BE49-F238E27FC236}">
-                <a16:creationId xmlns:a16="http://schemas.microsoft.com/office/drawing/2014/main" xmlns="" id="{A1546BA2-A746-4D78-BA2A-66EACE53308E}"/>
+                <a16:creationId xmlns="" xmlns:a16="http://schemas.microsoft.com/office/drawing/2014/main" id="{A1546BA2-A746-4D78-BA2A-66EACE53308E}"/>
               </a:ext>
             </a:extLst>
           </p:cNvPr>
@@ -21198,7 +20779,7 @@
           <p:cNvPr id="12" name="Imagem 11">
             <a:extLst>
               <a:ext uri="{FF2B5EF4-FFF2-40B4-BE49-F238E27FC236}">
-                <a16:creationId xmlns:a16="http://schemas.microsoft.com/office/drawing/2014/main" xmlns="" id="{A1546BA2-A746-4D78-BA2A-66EACE53308E}"/>
+                <a16:creationId xmlns="" xmlns:a16="http://schemas.microsoft.com/office/drawing/2014/main" id="{A1546BA2-A746-4D78-BA2A-66EACE53308E}"/>
               </a:ext>
             </a:extLst>
           </p:cNvPr>
@@ -21514,7 +21095,7 @@
           <p:cNvPr id="14" name="Imagem 13">
             <a:extLst>
               <a:ext uri="{FF2B5EF4-FFF2-40B4-BE49-F238E27FC236}">
-                <a16:creationId xmlns:a16="http://schemas.microsoft.com/office/drawing/2014/main" xmlns="" id="{A1546BA2-A746-4D78-BA2A-66EACE53308E}"/>
+                <a16:creationId xmlns="" xmlns:a16="http://schemas.microsoft.com/office/drawing/2014/main" id="{A1546BA2-A746-4D78-BA2A-66EACE53308E}"/>
               </a:ext>
             </a:extLst>
           </p:cNvPr>
@@ -21555,13 +21136,13 @@
   <p:clrMapOvr>
     <a:masterClrMapping/>
   </p:clrMapOvr>
-  <mc:AlternateContent xmlns:mc="http://schemas.openxmlformats.org/markup-compatibility/2006">
-    <mc:Choice xmlns:p14="http://schemas.microsoft.com/office/powerpoint/2010/main" Requires="p14">
+  <mc:AlternateContent xmlns:mc="http://schemas.openxmlformats.org/markup-compatibility/2006" xmlns:p14="http://schemas.microsoft.com/office/powerpoint/2010/main">
+    <mc:Choice Requires="p14">
       <p:transition spd="med" p14:dur="700">
         <p:fade/>
       </p:transition>
     </mc:Choice>
-    <mc:Fallback>
+    <mc:Fallback xmlns="">
       <p:transition spd="med">
         <p:fade/>
       </p:transition>
@@ -21830,7 +21411,7 @@
           <p:cNvPr id="14" name="Imagem 13">
             <a:extLst>
               <a:ext uri="{FF2B5EF4-FFF2-40B4-BE49-F238E27FC236}">
-                <a16:creationId xmlns:a16="http://schemas.microsoft.com/office/drawing/2014/main" xmlns="" id="{A1546BA2-A746-4D78-BA2A-66EACE53308E}"/>
+                <a16:creationId xmlns="" xmlns:a16="http://schemas.microsoft.com/office/drawing/2014/main" id="{A1546BA2-A746-4D78-BA2A-66EACE53308E}"/>
               </a:ext>
             </a:extLst>
           </p:cNvPr>
@@ -21871,13 +21452,13 @@
   <p:clrMapOvr>
     <a:masterClrMapping/>
   </p:clrMapOvr>
-  <mc:AlternateContent xmlns:mc="http://schemas.openxmlformats.org/markup-compatibility/2006">
-    <mc:Choice xmlns:p14="http://schemas.microsoft.com/office/powerpoint/2010/main" Requires="p14">
+  <mc:AlternateContent xmlns:mc="http://schemas.openxmlformats.org/markup-compatibility/2006" xmlns:p14="http://schemas.microsoft.com/office/powerpoint/2010/main">
+    <mc:Choice Requires="p14">
       <p:transition spd="med" p14:dur="700">
         <p:fade/>
       </p:transition>
     </mc:Choice>
-    <mc:Fallback>
+    <mc:Fallback xmlns="">
       <p:transition spd="med">
         <p:fade/>
       </p:transition>
@@ -22118,7 +21699,7 @@
           <p:cNvPr id="14" name="Imagem 13">
             <a:extLst>
               <a:ext uri="{FF2B5EF4-FFF2-40B4-BE49-F238E27FC236}">
-                <a16:creationId xmlns:a16="http://schemas.microsoft.com/office/drawing/2014/main" xmlns="" id="{A1546BA2-A746-4D78-BA2A-66EACE53308E}"/>
+                <a16:creationId xmlns="" xmlns:a16="http://schemas.microsoft.com/office/drawing/2014/main" id="{A1546BA2-A746-4D78-BA2A-66EACE53308E}"/>
               </a:ext>
             </a:extLst>
           </p:cNvPr>
@@ -22159,13 +21740,13 @@
   <p:clrMapOvr>
     <a:masterClrMapping/>
   </p:clrMapOvr>
-  <mc:AlternateContent xmlns:mc="http://schemas.openxmlformats.org/markup-compatibility/2006">
-    <mc:Choice xmlns:p14="http://schemas.microsoft.com/office/powerpoint/2010/main" Requires="p14">
+  <mc:AlternateContent xmlns:mc="http://schemas.openxmlformats.org/markup-compatibility/2006" xmlns:p14="http://schemas.microsoft.com/office/powerpoint/2010/main">
+    <mc:Choice Requires="p14">
       <p:transition spd="med" p14:dur="700">
         <p:fade/>
       </p:transition>
     </mc:Choice>
-    <mc:Fallback>
+    <mc:Fallback xmlns="">
       <p:transition spd="med">
         <p:fade/>
       </p:transition>
@@ -22380,7 +21961,7 @@
           <p:cNvPr id="7" name="Imagem 6">
             <a:extLst>
               <a:ext uri="{FF2B5EF4-FFF2-40B4-BE49-F238E27FC236}">
-                <a16:creationId xmlns:a16="http://schemas.microsoft.com/office/drawing/2014/main" xmlns="" id="{A1546BA2-A746-4D78-BA2A-66EACE53308E}"/>
+                <a16:creationId xmlns="" xmlns:a16="http://schemas.microsoft.com/office/drawing/2014/main" id="{A1546BA2-A746-4D78-BA2A-66EACE53308E}"/>
               </a:ext>
             </a:extLst>
           </p:cNvPr>
@@ -22451,13 +22032,13 @@
   <p:clrMapOvr>
     <a:masterClrMapping/>
   </p:clrMapOvr>
-  <mc:AlternateContent xmlns:mc="http://schemas.openxmlformats.org/markup-compatibility/2006">
-    <mc:Choice xmlns:p14="http://schemas.microsoft.com/office/powerpoint/2010/main" Requires="p14">
+  <mc:AlternateContent xmlns:mc="http://schemas.openxmlformats.org/markup-compatibility/2006" xmlns:p14="http://schemas.microsoft.com/office/powerpoint/2010/main">
+    <mc:Choice Requires="p14">
       <p:transition spd="med" p14:dur="700">
         <p:fade/>
       </p:transition>
     </mc:Choice>
-    <mc:Fallback>
+    <mc:Fallback xmlns="">
       <p:transition spd="med">
         <p:fade/>
       </p:transition>

</xml_diff>